<commit_message>
add mcp on iowrap
</commit_message>
<xml_diff>
--- a/Reports/Week 2 Report.pptx
+++ b/Reports/Week 2 Report.pptx
@@ -6792,7 +6792,7 @@
             </a:r>
             <a:r>
               <a:rPr lang="en-US" sz="1600" b="1" dirty="0"/>
-              <a:t> </a:t>
+              <a:t> tools</a:t>
             </a:r>
           </a:p>
           <a:p>
@@ -7156,58 +7156,95 @@
           </a:bodyPr>
           <a:lstStyle/>
           <a:p>
-            <a:r>
-              <a:rPr lang="en-US" dirty="0"/>
-              <a:t>Add additional features and optimize the </a:t>
+            <a:pPr marL="285750" indent="-285750">
+              <a:buFontTx/>
+              <a:buChar char="-"/>
+            </a:pPr>
+            <a:r>
+              <a:rPr lang="en-US" dirty="0"/>
+              <a:t>Installing </a:t>
             </a:r>
             <a:r>
               <a:rPr lang="en-US" dirty="0" err="1"/>
-              <a:t>FileSystem</a:t>
-            </a:r>
-            <a:r>
-              <a:rPr lang="en-US" dirty="0"/>
-              <a:t> Server code</a:t>
-            </a:r>
-          </a:p>
-          <a:p>
-            <a:pPr marL="569214" lvl="1"/>
-            <a:r>
-              <a:rPr lang="en-US" dirty="0"/>
-              <a:t>Implement functions to </a:t>
-            </a:r>
-          </a:p>
-          <a:p>
-            <a:pPr marL="852678" lvl="2"/>
-            <a:r>
-              <a:rPr lang="en-US" dirty="0"/>
-              <a:t>Create file/directory </a:t>
-            </a:r>
-          </a:p>
-          <a:p>
-            <a:pPr marL="852678" lvl="2"/>
-            <a:r>
-              <a:rPr lang="en-US" dirty="0"/>
-              <a:t>Give summary of a file/directory</a:t>
-            </a:r>
-          </a:p>
-          <a:p>
-            <a:r>
-              <a:rPr lang="en-US" dirty="0"/>
-              <a:t>Create MCP Server tools to manipulate Databases  </a:t>
-            </a:r>
-          </a:p>
-          <a:p>
-            <a:pPr marL="569214" lvl="1"/>
-            <a:r>
-              <a:rPr lang="en-US" dirty="0"/>
-              <a:t>Tools to execute queries for DB</a:t>
-            </a:r>
-          </a:p>
-          <a:p>
-            <a:r>
-              <a:rPr lang="en-US" dirty="0"/>
-              <a:t>Investigate how MCP installs dependencies 	</a:t>
-            </a:r>
+              <a:t>IOWrap</a:t>
+            </a:r>
+            <a:r>
+              <a:rPr lang="en-US" dirty="0"/>
+              <a:t> (Docker version)</a:t>
+            </a:r>
+          </a:p>
+          <a:p>
+            <a:pPr marL="285750" indent="-285750">
+              <a:buFontTx/>
+              <a:buChar char="-"/>
+            </a:pPr>
+            <a:r>
+              <a:rPr lang="en-US" dirty="0"/>
+              <a:t>Installing </a:t>
+            </a:r>
+            <a:r>
+              <a:rPr lang="en-US" dirty="0" err="1"/>
+              <a:t>mcps</a:t>
+            </a:r>
+            <a:r>
+              <a:rPr lang="en-US" dirty="0"/>
+              <a:t> on </a:t>
+            </a:r>
+            <a:r>
+              <a:rPr lang="en-US" dirty="0" err="1"/>
+              <a:t>iowrap</a:t>
+            </a:r>
+            <a:endParaRPr lang="en-US" dirty="0"/>
+          </a:p>
+          <a:p>
+            <a:pPr marL="285750" indent="-285750">
+              <a:buFontTx/>
+              <a:buChar char="-"/>
+            </a:pPr>
+            <a:r>
+              <a:rPr lang="en-US" dirty="0"/>
+              <a:t>Basic io functions with </a:t>
+            </a:r>
+            <a:r>
+              <a:rPr lang="en-US" dirty="0" err="1"/>
+              <a:t>IOWrap</a:t>
+            </a:r>
+            <a:r>
+              <a:rPr lang="en-US" dirty="0"/>
+              <a:t> using MCP</a:t>
+            </a:r>
+          </a:p>
+          <a:p>
+            <a:pPr marL="285750" indent="-285750">
+              <a:buFontTx/>
+              <a:buChar char="-"/>
+            </a:pPr>
+            <a:r>
+              <a:rPr lang="en-US" dirty="0"/>
+              <a:t>Inspect how </a:t>
+            </a:r>
+            <a:r>
+              <a:rPr lang="en-US" dirty="0" err="1"/>
+              <a:t>uv</a:t>
+            </a:r>
+            <a:r>
+              <a:rPr lang="en-US" dirty="0"/>
+              <a:t> installs MCP </a:t>
+            </a:r>
+          </a:p>
+          <a:p>
+            <a:pPr marL="285750" indent="-285750">
+              <a:buFontTx/>
+              <a:buChar char="-"/>
+            </a:pPr>
+            <a:endParaRPr lang="en-US" dirty="0"/>
+          </a:p>
+          <a:p>
+            <a:pPr marL="285750" indent="-285750">
+              <a:buFontTx/>
+              <a:buChar char="-"/>
+            </a:pPr>
+            <a:endParaRPr lang="en-US" dirty="0"/>
           </a:p>
         </p:txBody>
       </p:sp>
@@ -7318,6 +7355,55 @@
             <a:r>
               <a:rPr lang="en-US" dirty="0"/>
               <a:t>Thoughts</a:t>
+            </a:r>
+          </a:p>
+        </p:txBody>
+      </p:sp>
+      <p:sp>
+        <p:nvSpPr>
+          <p:cNvPr id="3" name="TextBox 2">
+            <a:extLst>
+              <a:ext uri="{FF2B5EF4-FFF2-40B4-BE49-F238E27FC236}">
+                <a16:creationId xmlns:a16="http://schemas.microsoft.com/office/drawing/2014/main" id="{E51FD576-6C3E-8775-CAE6-8C017BFC018E}"/>
+              </a:ext>
+            </a:extLst>
+          </p:cNvPr>
+          <p:cNvSpPr txBox="1"/>
+          <p:nvPr/>
+        </p:nvSpPr>
+        <p:spPr>
+          <a:xfrm>
+            <a:off x="6961239" y="3156155"/>
+            <a:ext cx="4195957" cy="646331"/>
+          </a:xfrm>
+          <a:prstGeom prst="rect">
+            <a:avLst/>
+          </a:prstGeom>
+          <a:noFill/>
+        </p:spPr>
+        <p:txBody>
+          <a:bodyPr wrap="none" rtlCol="0">
+            <a:spAutoFit/>
+          </a:bodyPr>
+          <a:lstStyle/>
+          <a:p>
+            <a:r>
+              <a:rPr lang="en-US" dirty="0">
+                <a:solidFill>
+                  <a:schemeClr val="bg1"/>
+                </a:solidFill>
+              </a:rPr>
+              <a:t>- MCP Tool for everything </a:t>
+            </a:r>
+          </a:p>
+          <a:p>
+            <a:r>
+              <a:rPr lang="en-US" dirty="0">
+                <a:solidFill>
+                  <a:schemeClr val="bg1"/>
+                </a:solidFill>
+              </a:rPr>
+              <a:t>- MCP tool package to manage all MCP</a:t>
             </a:r>
           </a:p>
         </p:txBody>
@@ -8225,35 +8311,6 @@
 </file>
 
 <file path=customXml/item1.xml><?xml version="1.0" encoding="utf-8"?>
-<?mso-contentType ?>
-<FormTemplates xmlns="http://schemas.microsoft.com/sharepoint/v3/contenttype/forms">
-  <Display>DocumentLibraryForm</Display>
-  <Edit>DocumentLibraryForm</Edit>
-  <New>DocumentLibraryForm</New>
-</FormTemplates>
-</file>
-
-<file path=customXml/item2.xml><?xml version="1.0" encoding="utf-8"?>
-<p:properties xmlns:p="http://schemas.microsoft.com/office/2006/metadata/properties" xmlns:xsi="http://www.w3.org/2001/XMLSchema-instance" xmlns:pc="http://schemas.microsoft.com/office/infopath/2007/PartnerControls">
-  <documentManagement>
-    <_ip_UnifiedCompliancePolicyUIAction xmlns="http://schemas.microsoft.com/sharepoint/v3" xsi:nil="true"/>
-    <Image xmlns="71af3243-3dd4-4a8d-8c0d-dd76da1f02a5">
-      <Url xsi:nil="true"/>
-      <Description xsi:nil="true"/>
-    </Image>
-    <Status xmlns="71af3243-3dd4-4a8d-8c0d-dd76da1f02a5">Not started</Status>
-    <Background xmlns="71af3243-3dd4-4a8d-8c0d-dd76da1f02a5">false</Background>
-    <_ip_UnifiedCompliancePolicyProperties xmlns="http://schemas.microsoft.com/sharepoint/v3" xsi:nil="true"/>
-    <ImageTagsTaxHTField xmlns="71af3243-3dd4-4a8d-8c0d-dd76da1f02a5">
-      <Terms xmlns="http://schemas.microsoft.com/office/infopath/2007/PartnerControls"/>
-    </ImageTagsTaxHTField>
-    <TaxCatchAll xmlns="230e9df3-be65-4c73-a93b-d1236ebd677e" xsi:nil="true"/>
-    <MediaServiceKeyPoints xmlns="71af3243-3dd4-4a8d-8c0d-dd76da1f02a5" xsi:nil="true"/>
-  </documentManagement>
-</p:properties>
-</file>
-
-<file path=customXml/item3.xml><?xml version="1.0" encoding="utf-8"?>
 <ct:contentTypeSchema xmlns:ct="http://schemas.microsoft.com/office/2006/metadata/contentType" xmlns:ma="http://schemas.microsoft.com/office/2006/metadata/properties/metaAttributes" ct:_="" ma:_="" ma:contentTypeName="Document" ma:contentTypeID="0x01010079F111ED35F8CC479449609E8A0923A6" ma:contentTypeVersion="28" ma:contentTypeDescription="Create a new document." ma:contentTypeScope="" ma:versionID="60f5a4f2d2b0abadcf532d48ebf9cb71">
   <xsd:schema xmlns:xsd="http://www.w3.org/2001/XMLSchema" xmlns:xs="http://www.w3.org/2001/XMLSchema" xmlns:p="http://schemas.microsoft.com/office/2006/metadata/properties" xmlns:ns1="http://schemas.microsoft.com/sharepoint/v3" xmlns:ns2="71af3243-3dd4-4a8d-8c0d-dd76da1f02a5" xmlns:ns3="16c05727-aa75-4e4a-9b5f-8a80a1165891" xmlns:ns4="230e9df3-be65-4c73-a93b-d1236ebd677e" targetNamespace="http://schemas.microsoft.com/office/2006/metadata/properties" ma:root="true" ma:fieldsID="7dd78129e6a1811f84807ad11c651531" ns1:_="" ns2:_="" ns3:_="" ns4:_="">
     <xsd:import namespace="http://schemas.microsoft.com/sharepoint/v3"/>
@@ -8565,27 +8622,36 @@
 </ct:contentTypeSchema>
 </file>
 
-<file path=customXml/itemProps1.xml><?xml version="1.0" encoding="utf-8"?>
-<ds:datastoreItem xmlns:ds="http://schemas.openxmlformats.org/officeDocument/2006/customXml" ds:itemID="{CABF691C-888B-4061-8A6F-D5CE84A0254B}">
-  <ds:schemaRefs>
-    <ds:schemaRef ds:uri="http://schemas.microsoft.com/sharepoint/v3/contenttype/forms"/>
-  </ds:schemaRefs>
-</ds:datastoreItem>
+<file path=customXml/item2.xml><?xml version="1.0" encoding="utf-8"?>
+<p:properties xmlns:p="http://schemas.microsoft.com/office/2006/metadata/properties" xmlns:xsi="http://www.w3.org/2001/XMLSchema-instance" xmlns:pc="http://schemas.microsoft.com/office/infopath/2007/PartnerControls">
+  <documentManagement>
+    <_ip_UnifiedCompliancePolicyUIAction xmlns="http://schemas.microsoft.com/sharepoint/v3" xsi:nil="true"/>
+    <Image xmlns="71af3243-3dd4-4a8d-8c0d-dd76da1f02a5">
+      <Url xsi:nil="true"/>
+      <Description xsi:nil="true"/>
+    </Image>
+    <Status xmlns="71af3243-3dd4-4a8d-8c0d-dd76da1f02a5">Not started</Status>
+    <Background xmlns="71af3243-3dd4-4a8d-8c0d-dd76da1f02a5">false</Background>
+    <_ip_UnifiedCompliancePolicyProperties xmlns="http://schemas.microsoft.com/sharepoint/v3" xsi:nil="true"/>
+    <ImageTagsTaxHTField xmlns="71af3243-3dd4-4a8d-8c0d-dd76da1f02a5">
+      <Terms xmlns="http://schemas.microsoft.com/office/infopath/2007/PartnerControls"/>
+    </ImageTagsTaxHTField>
+    <TaxCatchAll xmlns="230e9df3-be65-4c73-a93b-d1236ebd677e" xsi:nil="true"/>
+    <MediaServiceKeyPoints xmlns="71af3243-3dd4-4a8d-8c0d-dd76da1f02a5" xsi:nil="true"/>
+  </documentManagement>
+</p:properties>
 </file>
 
-<file path=customXml/itemProps2.xml><?xml version="1.0" encoding="utf-8"?>
-<ds:datastoreItem xmlns:ds="http://schemas.openxmlformats.org/officeDocument/2006/customXml" ds:itemID="{49168DCE-134F-4610-A6AA-88CEBE8D71D2}">
-  <ds:schemaRefs>
-    <ds:schemaRef ds:uri="http://schemas.microsoft.com/office/2006/metadata/properties"/>
-    <ds:schemaRef ds:uri="http://schemas.microsoft.com/office/infopath/2007/PartnerControls"/>
-    <ds:schemaRef ds:uri="http://schemas.microsoft.com/sharepoint/v3"/>
-    <ds:schemaRef ds:uri="71af3243-3dd4-4a8d-8c0d-dd76da1f02a5"/>
-    <ds:schemaRef ds:uri="230e9df3-be65-4c73-a93b-d1236ebd677e"/>
-  </ds:schemaRefs>
-</ds:datastoreItem>
+<file path=customXml/item3.xml><?xml version="1.0" encoding="utf-8"?>
+<?mso-contentType ?>
+<FormTemplates xmlns="http://schemas.microsoft.com/sharepoint/v3/contenttype/forms">
+  <Display>DocumentLibraryForm</Display>
+  <Edit>DocumentLibraryForm</Edit>
+  <New>DocumentLibraryForm</New>
+</FormTemplates>
 </file>
 
-<file path=customXml/itemProps3.xml><?xml version="1.0" encoding="utf-8"?>
+<file path=customXml/itemProps1.xml><?xml version="1.0" encoding="utf-8"?>
 <ds:datastoreItem xmlns:ds="http://schemas.openxmlformats.org/officeDocument/2006/customXml" ds:itemID="{5EDE3176-A15D-46A3-BDDB-64A0D7363224}">
   <ds:schemaRefs>
     <ds:schemaRef ds:uri="http://schemas.microsoft.com/office/2006/metadata/contentType"/>
@@ -8606,6 +8672,26 @@
 </ds:datastoreItem>
 </file>
 
+<file path=customXml/itemProps2.xml><?xml version="1.0" encoding="utf-8"?>
+<ds:datastoreItem xmlns:ds="http://schemas.openxmlformats.org/officeDocument/2006/customXml" ds:itemID="{49168DCE-134F-4610-A6AA-88CEBE8D71D2}">
+  <ds:schemaRefs>
+    <ds:schemaRef ds:uri="http://schemas.microsoft.com/office/2006/metadata/properties"/>
+    <ds:schemaRef ds:uri="http://schemas.microsoft.com/office/infopath/2007/PartnerControls"/>
+    <ds:schemaRef ds:uri="http://schemas.microsoft.com/sharepoint/v3"/>
+    <ds:schemaRef ds:uri="71af3243-3dd4-4a8d-8c0d-dd76da1f02a5"/>
+    <ds:schemaRef ds:uri="230e9df3-be65-4c73-a93b-d1236ebd677e"/>
+  </ds:schemaRefs>
+</ds:datastoreItem>
+</file>
+
+<file path=customXml/itemProps3.xml><?xml version="1.0" encoding="utf-8"?>
+<ds:datastoreItem xmlns:ds="http://schemas.openxmlformats.org/officeDocument/2006/customXml" ds:itemID="{CABF691C-888B-4061-8A6F-D5CE84A0254B}">
+  <ds:schemaRefs>
+    <ds:schemaRef ds:uri="http://schemas.microsoft.com/sharepoint/v3/contenttype/forms"/>
+  </ds:schemaRefs>
+</ds:datastoreItem>
+</file>
+
 <file path=docMetadata/LabelInfo.xml><?xml version="1.0" encoding="utf-8"?>
 <clbl:labelList xmlns:clbl="http://schemas.microsoft.com/office/2020/mipLabelMetadata"/>
 </file>
</xml_diff>